<commit_message>
Updated powerpoint - replaced spoonacular with newsapi.org
</commit_message>
<xml_diff>
--- a/Campusweek2.pptx
+++ b/Campusweek2.pptx
@@ -271,7 +271,7 @@
           <a:p>
             <a:fld id="{A5B3D146-1C67-CC47-8B75-C609DD762366}" type="datetimeFigureOut">
               <a:rPr lang="de-DE" smtClean="0"/>
-              <a:t>15.10.18</a:t>
+              <a:t>18.10.18</a:t>
             </a:fld>
             <a:endParaRPr lang="de-DE"/>
           </a:p>
@@ -471,7 +471,7 @@
           <a:p>
             <a:fld id="{A5B3D146-1C67-CC47-8B75-C609DD762366}" type="datetimeFigureOut">
               <a:rPr lang="de-DE" smtClean="0"/>
-              <a:t>15.10.18</a:t>
+              <a:t>18.10.18</a:t>
             </a:fld>
             <a:endParaRPr lang="de-DE"/>
           </a:p>
@@ -681,7 +681,7 @@
           <a:p>
             <a:fld id="{A5B3D146-1C67-CC47-8B75-C609DD762366}" type="datetimeFigureOut">
               <a:rPr lang="de-DE" smtClean="0"/>
-              <a:t>15.10.18</a:t>
+              <a:t>18.10.18</a:t>
             </a:fld>
             <a:endParaRPr lang="de-DE"/>
           </a:p>
@@ -881,7 +881,7 @@
           <a:p>
             <a:fld id="{A5B3D146-1C67-CC47-8B75-C609DD762366}" type="datetimeFigureOut">
               <a:rPr lang="de-DE" smtClean="0"/>
-              <a:t>15.10.18</a:t>
+              <a:t>18.10.18</a:t>
             </a:fld>
             <a:endParaRPr lang="de-DE"/>
           </a:p>
@@ -1157,7 +1157,7 @@
           <a:p>
             <a:fld id="{A5B3D146-1C67-CC47-8B75-C609DD762366}" type="datetimeFigureOut">
               <a:rPr lang="de-DE" smtClean="0"/>
-              <a:t>15.10.18</a:t>
+              <a:t>18.10.18</a:t>
             </a:fld>
             <a:endParaRPr lang="de-DE"/>
           </a:p>
@@ -1425,7 +1425,7 @@
           <a:p>
             <a:fld id="{A5B3D146-1C67-CC47-8B75-C609DD762366}" type="datetimeFigureOut">
               <a:rPr lang="de-DE" smtClean="0"/>
-              <a:t>15.10.18</a:t>
+              <a:t>18.10.18</a:t>
             </a:fld>
             <a:endParaRPr lang="de-DE"/>
           </a:p>
@@ -1840,7 +1840,7 @@
           <a:p>
             <a:fld id="{A5B3D146-1C67-CC47-8B75-C609DD762366}" type="datetimeFigureOut">
               <a:rPr lang="de-DE" smtClean="0"/>
-              <a:t>15.10.18</a:t>
+              <a:t>18.10.18</a:t>
             </a:fld>
             <a:endParaRPr lang="de-DE"/>
           </a:p>
@@ -1982,7 +1982,7 @@
           <a:p>
             <a:fld id="{A5B3D146-1C67-CC47-8B75-C609DD762366}" type="datetimeFigureOut">
               <a:rPr lang="de-DE" smtClean="0"/>
-              <a:t>15.10.18</a:t>
+              <a:t>18.10.18</a:t>
             </a:fld>
             <a:endParaRPr lang="de-DE"/>
           </a:p>
@@ -2095,7 +2095,7 @@
           <a:p>
             <a:fld id="{A5B3D146-1C67-CC47-8B75-C609DD762366}" type="datetimeFigureOut">
               <a:rPr lang="de-DE" smtClean="0"/>
-              <a:t>15.10.18</a:t>
+              <a:t>18.10.18</a:t>
             </a:fld>
             <a:endParaRPr lang="de-DE"/>
           </a:p>
@@ -2408,7 +2408,7 @@
           <a:p>
             <a:fld id="{A5B3D146-1C67-CC47-8B75-C609DD762366}" type="datetimeFigureOut">
               <a:rPr lang="de-DE" smtClean="0"/>
-              <a:t>15.10.18</a:t>
+              <a:t>18.10.18</a:t>
             </a:fld>
             <a:endParaRPr lang="de-DE"/>
           </a:p>
@@ -2697,7 +2697,7 @@
           <a:p>
             <a:fld id="{A5B3D146-1C67-CC47-8B75-C609DD762366}" type="datetimeFigureOut">
               <a:rPr lang="de-DE" smtClean="0"/>
-              <a:t>15.10.18</a:t>
+              <a:t>18.10.18</a:t>
             </a:fld>
             <a:endParaRPr lang="de-DE"/>
           </a:p>
@@ -2940,7 +2940,7 @@
           <a:p>
             <a:fld id="{A5B3D146-1C67-CC47-8B75-C609DD762366}" type="datetimeFigureOut">
               <a:rPr lang="de-DE" smtClean="0"/>
-              <a:t>15.10.18</a:t>
+              <a:t>18.10.18</a:t>
             </a:fld>
             <a:endParaRPr lang="de-DE"/>
           </a:p>
@@ -3510,12 +3510,14 @@
           </a:p>
           <a:p>
             <a:r>
-              <a:rPr lang="de-DE" dirty="0" err="1"/>
-              <a:t>Spoonacular</a:t>
-            </a:r>
-            <a:r>
-              <a:rPr lang="de-DE" dirty="0"/>
-              <a:t> API in Postman anschauen – rumspielen </a:t>
+              <a:rPr lang="de-DE" dirty="0">
+                <a:hlinkClick r:id="rId2"/>
+              </a:rPr>
+              <a:t>https://newsapi.org</a:t>
+            </a:r>
+            <a:r>
+              <a:rPr lang="de-DE" dirty="0"/>
+              <a:t> in Postman anschauen – rumspielen </a:t>
             </a:r>
             <a:r>
               <a:rPr lang="de-DE" dirty="0">
@@ -3732,7 +3734,7 @@
           <a:p>
             <a:r>
               <a:rPr lang="de-DE" dirty="0" err="1"/>
-              <a:t>Spoonacular</a:t>
+              <a:t>Newsapi</a:t>
             </a:r>
             <a:r>
               <a:rPr lang="de-DE" dirty="0"/>
@@ -3742,11 +3744,14 @@
               <a:rPr lang="de-DE" dirty="0">
                 <a:hlinkClick r:id="rId6"/>
               </a:rPr>
-              <a:t>https://spoonacular.com/api/docs/recipes-api</a:t>
-            </a:r>
-            <a:endParaRPr lang="de-DE" dirty="0"/>
-          </a:p>
-          <a:p>
+              <a:t>https://newsapi</a:t>
+            </a:r>
+            <a:r>
+              <a:rPr lang="de-DE">
+                <a:hlinkClick r:id="rId6"/>
+              </a:rPr>
+              <a:t>.org</a:t>
+            </a:r>
             <a:endParaRPr lang="de-DE" dirty="0"/>
           </a:p>
           <a:p>
@@ -4383,7 +4388,9 @@
         </p:nvSpPr>
         <p:spPr/>
         <p:txBody>
-          <a:bodyPr/>
+          <a:bodyPr>
+            <a:normAutofit lnSpcReduction="10000"/>
+          </a:bodyPr>
           <a:lstStyle/>
           <a:p>
             <a:r>
@@ -4410,7 +4417,7 @@
             </a:r>
             <a:r>
               <a:rPr lang="de-DE" dirty="0" err="1"/>
-              <a:t>recipes</a:t>
+              <a:t>news</a:t>
             </a:r>
             <a:r>
               <a:rPr lang="de-DE" dirty="0"/>
@@ -4418,6 +4425,14 @@
             </a:r>
             <a:r>
               <a:rPr lang="de-DE" dirty="0" err="1"/>
+              <a:t>articles</a:t>
+            </a:r>
+            <a:r>
+              <a:rPr lang="de-DE" dirty="0"/>
+              <a:t> </a:t>
+            </a:r>
+            <a:r>
+              <a:rPr lang="de-DE" dirty="0" err="1"/>
               <a:t>from</a:t>
             </a:r>
             <a:r>
@@ -4446,15 +4461,7 @@
             </a:r>
             <a:r>
               <a:rPr lang="de-DE" dirty="0"/>
-              <a:t> (</a:t>
-            </a:r>
-            <a:r>
-              <a:rPr lang="de-DE" dirty="0" err="1"/>
-              <a:t>ingredients</a:t>
-            </a:r>
-            <a:r>
-              <a:rPr lang="de-DE" dirty="0"/>
-              <a:t>)</a:t>
+              <a:t> </a:t>
             </a:r>
           </a:p>
           <a:p>
@@ -4464,7 +4471,7 @@
             </a:r>
             <a:r>
               <a:rPr lang="de-DE" dirty="0" err="1"/>
-              <a:t>recipes</a:t>
+              <a:t>articles</a:t>
             </a:r>
             <a:r>
               <a:rPr lang="de-DE" dirty="0"/>
@@ -4486,16 +4493,65 @@
           </a:p>
           <a:p>
             <a:r>
+              <a:rPr lang="de-DE" dirty="0"/>
+              <a:t>[optional] like </a:t>
+            </a:r>
+            <a:r>
+              <a:rPr lang="de-DE" dirty="0" err="1"/>
+              <a:t>articles</a:t>
+            </a:r>
+            <a:endParaRPr lang="de-DE" dirty="0"/>
+          </a:p>
+          <a:p>
+            <a:r>
               <a:rPr lang="de-DE" dirty="0" err="1"/>
               <a:t>Get</a:t>
             </a:r>
             <a:r>
               <a:rPr lang="de-DE" dirty="0"/>
+              <a:t> personal </a:t>
+            </a:r>
+            <a:r>
+              <a:rPr lang="de-DE" dirty="0" err="1"/>
+              <a:t>favourites</a:t>
+            </a:r>
+            <a:r>
+              <a:rPr lang="de-DE" dirty="0"/>
               <a:t> </a:t>
             </a:r>
             <a:r>
               <a:rPr lang="de-DE" dirty="0" err="1"/>
-              <a:t>favourite</a:t>
+              <a:t>from</a:t>
+            </a:r>
+            <a:r>
+              <a:rPr lang="de-DE" dirty="0"/>
+              <a:t> backend</a:t>
+            </a:r>
+          </a:p>
+          <a:p>
+            <a:r>
+              <a:rPr lang="de-DE" dirty="0"/>
+              <a:t>Show </a:t>
+            </a:r>
+            <a:r>
+              <a:rPr lang="de-DE" dirty="0" err="1"/>
+              <a:t>results</a:t>
+            </a:r>
+            <a:r>
+              <a:rPr lang="de-DE" dirty="0"/>
+              <a:t> in 2 </a:t>
+            </a:r>
+            <a:r>
+              <a:rPr lang="de-DE" dirty="0" err="1"/>
+              <a:t>listviews</a:t>
+            </a:r>
+            <a:r>
+              <a:rPr lang="de-DE" dirty="0"/>
+              <a:t> : </a:t>
+            </a:r>
+            <a:r>
+              <a:rPr lang="de-DE" dirty="0" err="1"/>
+              <a:t>search</a:t>
             </a:r>
             <a:r>
               <a:rPr lang="de-DE" dirty="0"/>
@@ -4503,7 +4559,7 @@
             </a:r>
             <a:r>
               <a:rPr lang="de-DE" dirty="0" err="1"/>
-              <a:t>recipes</a:t>
+              <a:t>and</a:t>
             </a:r>
             <a:r>
               <a:rPr lang="de-DE" dirty="0"/>
@@ -4511,37 +4567,18 @@
             </a:r>
             <a:r>
               <a:rPr lang="de-DE" dirty="0" err="1"/>
-              <a:t>from</a:t>
-            </a:r>
-            <a:r>
-              <a:rPr lang="de-DE" dirty="0"/>
-              <a:t> backend</a:t>
-            </a:r>
-          </a:p>
-          <a:p>
-            <a:r>
-              <a:rPr lang="de-DE" dirty="0"/>
-              <a:t>Show </a:t>
-            </a:r>
-            <a:r>
-              <a:rPr lang="de-DE" dirty="0" err="1"/>
-              <a:t>results</a:t>
-            </a:r>
-            <a:r>
-              <a:rPr lang="de-DE" dirty="0"/>
-              <a:t> in 2 </a:t>
-            </a:r>
-            <a:r>
-              <a:rPr lang="de-DE" dirty="0" err="1"/>
-              <a:t>listviews</a:t>
-            </a:r>
-            <a:r>
-              <a:rPr lang="de-DE" dirty="0"/>
-              <a:t> : </a:t>
-            </a:r>
-            <a:r>
-              <a:rPr lang="de-DE" dirty="0" err="1"/>
-              <a:t>search</a:t>
+              <a:t>favourites</a:t>
+            </a:r>
+            <a:endParaRPr lang="de-DE" dirty="0"/>
+          </a:p>
+          <a:p>
+            <a:r>
+              <a:rPr lang="de-DE" dirty="0"/>
+              <a:t>[optional] Show 10 </a:t>
+            </a:r>
+            <a:r>
+              <a:rPr lang="de-DE" dirty="0" err="1"/>
+              <a:t>most</a:t>
             </a:r>
             <a:r>
               <a:rPr lang="de-DE" dirty="0"/>
@@ -4549,7 +4586,7 @@
             </a:r>
             <a:r>
               <a:rPr lang="de-DE" dirty="0" err="1"/>
-              <a:t>and</a:t>
+              <a:t>liked</a:t>
             </a:r>
             <a:r>
               <a:rPr lang="de-DE" dirty="0"/>
@@ -4557,7 +4594,7 @@
             </a:r>
             <a:r>
               <a:rPr lang="de-DE" dirty="0" err="1"/>
-              <a:t>favourites</a:t>
+              <a:t>articles</a:t>
             </a:r>
             <a:endParaRPr lang="de-DE" dirty="0"/>
           </a:p>
@@ -4747,7 +4784,7 @@
         <p:spPr/>
         <p:txBody>
           <a:bodyPr>
-            <a:normAutofit fontScale="85000" lnSpcReduction="20000"/>
+            <a:normAutofit fontScale="92500" lnSpcReduction="20000"/>
           </a:bodyPr>
           <a:lstStyle/>
           <a:p>
@@ -4838,8 +4875,12 @@
           </a:p>
           <a:p>
             <a:r>
-              <a:rPr lang="de-DE" dirty="0" err="1"/>
-              <a:t>Recipes</a:t>
+              <a:rPr lang="de-DE" dirty="0"/>
+              <a:t>News </a:t>
+            </a:r>
+            <a:r>
+              <a:rPr lang="de-DE" dirty="0" err="1"/>
+              <a:t>article</a:t>
             </a:r>
             <a:r>
               <a:rPr lang="de-DE" dirty="0"/>
@@ -4870,15 +4911,7 @@
             </a:r>
             <a:r>
               <a:rPr lang="de-DE" dirty="0"/>
-              <a:t> (</a:t>
-            </a:r>
-            <a:r>
-              <a:rPr lang="de-DE" dirty="0" err="1"/>
-              <a:t>ingredients</a:t>
-            </a:r>
-            <a:r>
-              <a:rPr lang="de-DE" dirty="0"/>
-              <a:t>) </a:t>
+              <a:t> </a:t>
             </a:r>
             <a:r>
               <a:rPr lang="de-DE" dirty="0" err="1"/>
@@ -4906,7 +4939,7 @@
             </a:r>
             <a:r>
               <a:rPr lang="de-DE" dirty="0" err="1"/>
-              <a:t>recipes</a:t>
+              <a:t>articles</a:t>
             </a:r>
             <a:r>
               <a:rPr lang="de-DE" dirty="0"/>
@@ -4921,40 +4954,10 @@
               <a:t> </a:t>
             </a:r>
             <a:r>
-              <a:rPr lang="de-DE" dirty="0" err="1"/>
-              <a:t>spoonacular</a:t>
-            </a:r>
-            <a:r>
-              <a:rPr lang="de-DE" dirty="0"/>
-              <a:t> https://</a:t>
-            </a:r>
-            <a:r>
-              <a:rPr lang="de-DE" dirty="0" err="1"/>
-              <a:t>spoonacular.com</a:t>
-            </a:r>
-            <a:r>
-              <a:rPr lang="de-DE" dirty="0"/>
-              <a:t>/</a:t>
-            </a:r>
-            <a:r>
-              <a:rPr lang="de-DE" dirty="0" err="1"/>
-              <a:t>api</a:t>
-            </a:r>
-            <a:r>
-              <a:rPr lang="de-DE" dirty="0"/>
-              <a:t>/</a:t>
-            </a:r>
-            <a:r>
-              <a:rPr lang="de-DE" dirty="0" err="1"/>
-              <a:t>docs</a:t>
-            </a:r>
-            <a:r>
-              <a:rPr lang="de-DE" dirty="0"/>
-              <a:t>/</a:t>
-            </a:r>
-            <a:r>
-              <a:rPr lang="de-DE" dirty="0" err="1"/>
-              <a:t>recipes-api</a:t>
+              <a:rPr lang="de-DE" dirty="0">
+                <a:hlinkClick r:id="rId2"/>
+              </a:rPr>
+              <a:t>https://newsapi.org</a:t>
             </a:r>
             <a:endParaRPr lang="de-DE" dirty="0"/>
           </a:p>
@@ -4978,7 +4981,7 @@
             </a:r>
             <a:r>
               <a:rPr lang="de-DE" dirty="0" err="1"/>
-              <a:t>recipes</a:t>
+              <a:t>articles</a:t>
             </a:r>
             <a:endParaRPr lang="de-DE" dirty="0"/>
           </a:p>
@@ -5012,59 +5015,19 @@
             </a:r>
             <a:r>
               <a:rPr lang="de-DE" dirty="0" err="1"/>
-              <a:t>recipe</a:t>
+              <a:t>article</a:t>
             </a:r>
             <a:endParaRPr lang="de-DE" dirty="0"/>
           </a:p>
           <a:p>
             <a:pPr lvl="1"/>
             <a:r>
-              <a:rPr lang="de-DE" dirty="0" err="1"/>
-              <a:t>Get</a:t>
-            </a:r>
-            <a:r>
-              <a:rPr lang="de-DE" dirty="0"/>
-              <a:t> </a:t>
-            </a:r>
-            <a:r>
-              <a:rPr lang="de-DE" dirty="0" err="1"/>
-              <a:t>recipe</a:t>
-            </a:r>
-            <a:r>
-              <a:rPr lang="de-DE" dirty="0"/>
-              <a:t> </a:t>
-            </a:r>
-            <a:r>
-              <a:rPr lang="de-DE" dirty="0" err="1"/>
-              <a:t>from</a:t>
-            </a:r>
-            <a:r>
-              <a:rPr lang="de-DE" dirty="0"/>
-              <a:t> </a:t>
-            </a:r>
-            <a:r>
-              <a:rPr lang="de-DE" dirty="0" err="1"/>
-              <a:t>spoonacular</a:t>
-            </a:r>
-            <a:endParaRPr lang="de-DE" dirty="0"/>
-          </a:p>
-          <a:p>
-            <a:pPr lvl="1"/>
-            <a:r>
               <a:rPr lang="de-DE" dirty="0"/>
               <a:t>Store </a:t>
             </a:r>
             <a:r>
               <a:rPr lang="de-DE" dirty="0" err="1"/>
-              <a:t>max</a:t>
-            </a:r>
-            <a:r>
-              <a:rPr lang="de-DE" dirty="0"/>
-              <a:t> 10 </a:t>
-            </a:r>
-            <a:r>
-              <a:rPr lang="de-DE" dirty="0" err="1"/>
-              <a:t>recipes</a:t>
+              <a:t>article</a:t>
             </a:r>
             <a:r>
               <a:rPr lang="de-DE" dirty="0"/>
@@ -6172,8 +6135,10 @@
           </a:p>
           <a:p>
             <a:r>
-              <a:rPr lang="de-DE" dirty="0" err="1"/>
-              <a:t>Spoonacular</a:t>
+              <a:rPr lang="de-DE" dirty="0">
+                <a:hlinkClick r:id="rId2"/>
+              </a:rPr>
+              <a:t>https://newsapi.org</a:t>
             </a:r>
             <a:r>
               <a:rPr lang="de-DE" dirty="0"/>

</xml_diff>